<commit_message>
Update 2017-09 f2f slides
</commit_message>
<xml_diff>
--- a/slides/2017-09-20-Catastrophic-WG.pptx
+++ b/slides/2017-09-20-Catastrophic-WG.pptx
@@ -7,8 +7,8 @@
   <p:sldIdLst>
     <p:sldId id="256" r:id="rId2"/>
     <p:sldId id="257" r:id="rId3"/>
-    <p:sldId id="258" r:id="rId4"/>
-    <p:sldId id="259" r:id="rId5"/>
+    <p:sldId id="259" r:id="rId4"/>
+    <p:sldId id="258" r:id="rId5"/>
     <p:sldId id="260" r:id="rId6"/>
   </p:sldIdLst>
   <p:sldSz cx="12192000" cy="6858000"/>
@@ -108,6 +108,11 @@
       </a:defRPr>
     </a:lvl9pPr>
   </p:defaultTextStyle>
+  <p:extLst>
+    <p:ext uri="{EFAFB233-063F-42B5-8137-9DF3F51BA10A}">
+      <p15:sldGuideLst xmlns:p15="http://schemas.microsoft.com/office/powerpoint/2012/main"/>
+    </p:ext>
+  </p:extLst>
 </p:presentation>
 </file>
 
@@ -242,7 +247,7 @@
           <a:p>
             <a:fld id="{5E747A89-5B84-B944-AD26-41049764DCC9}" type="datetimeFigureOut">
               <a:rPr lang="en-US" smtClean="0"/>
-              <a:t>9/13/17</a:t>
+              <a:t>9/20/17</a:t>
             </a:fld>
             <a:endParaRPr lang="en-US"/>
           </a:p>
@@ -412,7 +417,7 @@
           <a:p>
             <a:fld id="{5E747A89-5B84-B944-AD26-41049764DCC9}" type="datetimeFigureOut">
               <a:rPr lang="en-US" smtClean="0"/>
-              <a:t>9/13/17</a:t>
+              <a:t>9/20/17</a:t>
             </a:fld>
             <a:endParaRPr lang="en-US"/>
           </a:p>
@@ -592,7 +597,7 @@
           <a:p>
             <a:fld id="{5E747A89-5B84-B944-AD26-41049764DCC9}" type="datetimeFigureOut">
               <a:rPr lang="en-US" smtClean="0"/>
-              <a:t>9/13/17</a:t>
+              <a:t>9/20/17</a:t>
             </a:fld>
             <a:endParaRPr lang="en-US"/>
           </a:p>
@@ -762,7 +767,7 @@
           <a:p>
             <a:fld id="{5E747A89-5B84-B944-AD26-41049764DCC9}" type="datetimeFigureOut">
               <a:rPr lang="en-US" smtClean="0"/>
-              <a:t>9/13/17</a:t>
+              <a:t>9/20/17</a:t>
             </a:fld>
             <a:endParaRPr lang="en-US"/>
           </a:p>
@@ -1008,7 +1013,7 @@
           <a:p>
             <a:fld id="{5E747A89-5B84-B944-AD26-41049764DCC9}" type="datetimeFigureOut">
               <a:rPr lang="en-US" smtClean="0"/>
-              <a:t>9/13/17</a:t>
+              <a:t>9/20/17</a:t>
             </a:fld>
             <a:endParaRPr lang="en-US"/>
           </a:p>
@@ -1240,7 +1245,7 @@
           <a:p>
             <a:fld id="{5E747A89-5B84-B944-AD26-41049764DCC9}" type="datetimeFigureOut">
               <a:rPr lang="en-US" smtClean="0"/>
-              <a:t>9/13/17</a:t>
+              <a:t>9/20/17</a:t>
             </a:fld>
             <a:endParaRPr lang="en-US"/>
           </a:p>
@@ -1607,7 +1612,7 @@
           <a:p>
             <a:fld id="{5E747A89-5B84-B944-AD26-41049764DCC9}" type="datetimeFigureOut">
               <a:rPr lang="en-US" smtClean="0"/>
-              <a:t>9/13/17</a:t>
+              <a:t>9/20/17</a:t>
             </a:fld>
             <a:endParaRPr lang="en-US"/>
           </a:p>
@@ -1725,7 +1730,7 @@
           <a:p>
             <a:fld id="{5E747A89-5B84-B944-AD26-41049764DCC9}" type="datetimeFigureOut">
               <a:rPr lang="en-US" smtClean="0"/>
-              <a:t>9/13/17</a:t>
+              <a:t>9/20/17</a:t>
             </a:fld>
             <a:endParaRPr lang="en-US"/>
           </a:p>
@@ -1820,7 +1825,7 @@
           <a:p>
             <a:fld id="{5E747A89-5B84-B944-AD26-41049764DCC9}" type="datetimeFigureOut">
               <a:rPr lang="en-US" smtClean="0"/>
-              <a:t>9/13/17</a:t>
+              <a:t>9/20/17</a:t>
             </a:fld>
             <a:endParaRPr lang="en-US"/>
           </a:p>
@@ -2097,7 +2102,7 @@
           <a:p>
             <a:fld id="{5E747A89-5B84-B944-AD26-41049764DCC9}" type="datetimeFigureOut">
               <a:rPr lang="en-US" smtClean="0"/>
-              <a:t>9/13/17</a:t>
+              <a:t>9/20/17</a:t>
             </a:fld>
             <a:endParaRPr lang="en-US"/>
           </a:p>
@@ -2350,7 +2355,7 @@
           <a:p>
             <a:fld id="{5E747A89-5B84-B944-AD26-41049764DCC9}" type="datetimeFigureOut">
               <a:rPr lang="en-US" smtClean="0"/>
-              <a:t>9/13/17</a:t>
+              <a:t>9/20/17</a:t>
             </a:fld>
             <a:endParaRPr lang="en-US"/>
           </a:p>
@@ -2563,7 +2568,7 @@
           <a:p>
             <a:fld id="{5E747A89-5B84-B944-AD26-41049764DCC9}" type="datetimeFigureOut">
               <a:rPr lang="en-US" smtClean="0"/>
-              <a:t>9/13/17</a:t>
+              <a:t>9/20/17</a:t>
             </a:fld>
             <a:endParaRPr lang="en-US"/>
           </a:p>
@@ -3143,7 +3148,7 @@
           <a:p>
             <a:r>
               <a:rPr lang="en-US" dirty="0" smtClean="0"/>
-              <a:t>Concerns</a:t>
+              <a:t>Proposal</a:t>
             </a:r>
             <a:endParaRPr lang="en-US" dirty="0"/>
           </a:p>
@@ -3166,53 +3171,36 @@
           <a:p>
             <a:r>
               <a:rPr lang="en-US" dirty="0" smtClean="0"/>
-              <a:t>What can we tell the user that will allow them to try to fix things while the application is running?</a:t>
+              <a:t>Add a requirement that MPI must continue correctly after a non-catastrophic error.</a:t>
             </a:r>
           </a:p>
           <a:p>
             <a:pPr lvl="1"/>
             <a:r>
-              <a:rPr lang="en-US" dirty="0" smtClean="0">
-                <a:solidFill>
-                  <a:srgbClr val="FF0000"/>
-                </a:solidFill>
-              </a:rPr>
-              <a:t>If the app is badly behaved (has bugs, allocates too much memory or too many MPI objects), it probably can’t fix things.</a:t>
+              <a:rPr lang="en-US" dirty="0" smtClean="0"/>
+              <a:t>The implementation decides what’s catastrophic and what isn’t so it’s legal to say everything is catastrophic.</a:t>
+            </a:r>
+          </a:p>
+          <a:p>
+            <a:r>
+              <a:rPr lang="en-US" dirty="0" smtClean="0"/>
+              <a:t>Add a function MPI_GET_STATE that returns the state of the library (MPI_IS_OK or MPI_IS_CATASTROPHIC).</a:t>
             </a:r>
           </a:p>
           <a:p>
             <a:pPr lvl="1"/>
             <a:r>
-              <a:rPr lang="en-US" dirty="0" smtClean="0">
-                <a:solidFill>
-                  <a:srgbClr val="00B050"/>
-                </a:solidFill>
-              </a:rPr>
-              <a:t>If the app is well behaved, it can learn things about the internals of the system and try to recover.</a:t>
-            </a:r>
-          </a:p>
-          <a:p>
-            <a:pPr lvl="2"/>
-            <a:r>
-              <a:rPr lang="en-US" dirty="0" smtClean="0">
-                <a:solidFill>
-                  <a:srgbClr val="00B050"/>
-                </a:solidFill>
-              </a:rPr>
-              <a:t>Maybe it runs on different systems that might have more or fewer resources.</a:t>
-            </a:r>
-            <a:endParaRPr lang="en-US" dirty="0">
-              <a:solidFill>
-                <a:srgbClr val="00B050"/>
-              </a:solidFill>
-            </a:endParaRPr>
+              <a:rPr lang="en-US" dirty="0" smtClean="0"/>
+              <a:t>Local function, doesn’t say anything about other processes.</a:t>
+            </a:r>
+            <a:endParaRPr lang="en-US" dirty="0"/>
           </a:p>
         </p:txBody>
       </p:sp>
     </p:spTree>
     <p:extLst>
       <p:ext uri="{BB962C8B-B14F-4D97-AF65-F5344CB8AC3E}">
-        <p14:creationId xmlns:p14="http://schemas.microsoft.com/office/powerpoint/2010/main" val="1701875056"/>
+        <p14:creationId xmlns:p14="http://schemas.microsoft.com/office/powerpoint/2010/main" val="1837186568"/>
       </p:ext>
     </p:extLst>
   </p:cSld>
@@ -3256,7 +3244,7 @@
           <a:p>
             <a:r>
               <a:rPr lang="en-US" dirty="0" smtClean="0"/>
-              <a:t>Proposal</a:t>
+              <a:t>Concerns</a:t>
             </a:r>
             <a:endParaRPr lang="en-US" dirty="0"/>
           </a:p>
@@ -3279,36 +3267,53 @@
           <a:p>
             <a:r>
               <a:rPr lang="en-US" dirty="0" smtClean="0"/>
-              <a:t>Add a requirement that MPI must continue correctly after a non-catastrophic error.</a:t>
+              <a:t>What can we tell the user that will allow them to try to fix things while the application is running?</a:t>
             </a:r>
           </a:p>
           <a:p>
             <a:pPr lvl="1"/>
             <a:r>
-              <a:rPr lang="en-US" dirty="0" smtClean="0"/>
-              <a:t>The implementation decides what’s catastrophic and what isn’t so it’s legal to say everything is catastrophic.</a:t>
-            </a:r>
-          </a:p>
-          <a:p>
-            <a:r>
-              <a:rPr lang="en-US" dirty="0" smtClean="0"/>
-              <a:t>Add a function MPI_GET_STATE that returns the state of the library (MPI_IS_OK or MPI_IS_CATASTROPHIC).</a:t>
+              <a:rPr lang="en-US" dirty="0" smtClean="0">
+                <a:solidFill>
+                  <a:srgbClr val="FF0000"/>
+                </a:solidFill>
+              </a:rPr>
+              <a:t>If the app is badly behaved (has bugs, allocates too much memory or too many MPI objects), it probably can’t fix things.</a:t>
             </a:r>
           </a:p>
           <a:p>
             <a:pPr lvl="1"/>
             <a:r>
-              <a:rPr lang="en-US" dirty="0" smtClean="0"/>
-              <a:t>Local function, doesn’t say anything about other processes.</a:t>
-            </a:r>
-            <a:endParaRPr lang="en-US" dirty="0"/>
+              <a:rPr lang="en-US" dirty="0" smtClean="0">
+                <a:solidFill>
+                  <a:srgbClr val="00B050"/>
+                </a:solidFill>
+              </a:rPr>
+              <a:t>If the app is well behaved, it can learn things about the internals of the system and try to recover.</a:t>
+            </a:r>
+          </a:p>
+          <a:p>
+            <a:pPr lvl="2"/>
+            <a:r>
+              <a:rPr lang="en-US" dirty="0" smtClean="0">
+                <a:solidFill>
+                  <a:srgbClr val="00B050"/>
+                </a:solidFill>
+              </a:rPr>
+              <a:t>Maybe it runs on different systems that might have more or fewer resources.</a:t>
+            </a:r>
+            <a:endParaRPr lang="en-US" dirty="0">
+              <a:solidFill>
+                <a:srgbClr val="00B050"/>
+              </a:solidFill>
+            </a:endParaRPr>
           </a:p>
         </p:txBody>
       </p:sp>
     </p:spTree>
     <p:extLst>
       <p:ext uri="{BB962C8B-B14F-4D97-AF65-F5344CB8AC3E}">
-        <p14:creationId xmlns:p14="http://schemas.microsoft.com/office/powerpoint/2010/main" val="1837186568"/>
+        <p14:creationId xmlns:p14="http://schemas.microsoft.com/office/powerpoint/2010/main" val="1701875056"/>
       </p:ext>
     </p:extLst>
   </p:cSld>

</xml_diff>